<commit_message>
En esta version escribi Walter en el Power Point
</commit_message>
<xml_diff>
--- a/tarea de powerpoint.pptx
+++ b/tarea de powerpoint.pptx
@@ -113,6 +113,11 @@
       </a:defRPr>
     </a:lvl9pPr>
   </p:defaultTextStyle>
+  <p:extLst>
+    <p:ext uri="{EFAFB233-063F-42B5-8137-9DF3F51BA10A}">
+      <p15:sldGuideLst xmlns:p15="http://schemas.microsoft.com/office/powerpoint/2012/main"/>
+    </p:ext>
+  </p:extLst>
 </p:presentation>
 </file>
 
@@ -2975,39 +2980,66 @@
       </p:grpSpPr>
       <p:sp>
         <p:nvSpPr>
-          <p:cNvPr id="2" name="Título 1"/>
-          <p:cNvSpPr>
-            <a:spLocks noGrp="1"/>
-          </p:cNvSpPr>
-          <p:nvPr>
-            <p:ph type="ctrTitle"/>
-          </p:nvPr>
-        </p:nvSpPr>
-        <p:spPr/>
-        <p:txBody>
-          <a:bodyPr/>
-          <a:lstStyle/>
-          <a:p>
-            <a:endParaRPr lang="es-ES"/>
-          </a:p>
-        </p:txBody>
-      </p:sp>
-      <p:sp>
-        <p:nvSpPr>
-          <p:cNvPr id="3" name="Subtítulo 2"/>
-          <p:cNvSpPr>
-            <a:spLocks noGrp="1"/>
-          </p:cNvSpPr>
-          <p:nvPr>
-            <p:ph type="subTitle" idx="1"/>
-          </p:nvPr>
-        </p:nvSpPr>
-        <p:spPr/>
-        <p:txBody>
-          <a:bodyPr/>
-          <a:lstStyle/>
-          <a:p>
-            <a:endParaRPr lang="es-ES"/>
+          <p:cNvPr id="4" name="Rectángulo 3"/>
+          <p:cNvSpPr/>
+          <p:nvPr/>
+        </p:nvSpPr>
+        <p:spPr>
+          <a:xfrm>
+            <a:off x="5032952" y="2967335"/>
+            <a:ext cx="2126096" cy="923330"/>
+          </a:xfrm>
+          <a:prstGeom prst="rect">
+            <a:avLst/>
+          </a:prstGeom>
+          <a:noFill/>
+        </p:spPr>
+        <p:txBody>
+          <a:bodyPr wrap="none" lIns="91440" tIns="45720" rIns="91440" bIns="45720">
+            <a:spAutoFit/>
+          </a:bodyPr>
+          <a:lstStyle/>
+          <a:p>
+            <a:pPr algn="ctr"/>
+            <a:r>
+              <a:rPr lang="en-US" sz="5400" b="1" cap="none" spc="0" smtClean="0">
+                <a:ln w="9525">
+                  <a:solidFill>
+                    <a:schemeClr val="bg1"/>
+                  </a:solidFill>
+                  <a:prstDash val="solid"/>
+                </a:ln>
+                <a:solidFill>
+                  <a:schemeClr val="tx1"/>
+                </a:solidFill>
+                <a:effectLst>
+                  <a:outerShdw blurRad="12700" dist="38100" dir="2700000" algn="tl" rotWithShape="0">
+                    <a:schemeClr val="bg1">
+                      <a:lumMod val="50000"/>
+                    </a:schemeClr>
+                  </a:outerShdw>
+                </a:effectLst>
+              </a:rPr>
+              <a:t>Walter</a:t>
+            </a:r>
+            <a:endParaRPr lang="es-ES" sz="5400" b="1" cap="none" spc="0" dirty="0">
+              <a:ln w="9525">
+                <a:solidFill>
+                  <a:schemeClr val="bg1"/>
+                </a:solidFill>
+                <a:prstDash val="solid"/>
+              </a:ln>
+              <a:solidFill>
+                <a:schemeClr val="tx1"/>
+              </a:solidFill>
+              <a:effectLst>
+                <a:outerShdw blurRad="12700" dist="38100" dir="2700000" algn="tl" rotWithShape="0">
+                  <a:schemeClr val="bg1">
+                    <a:lumMod val="50000"/>
+                  </a:schemeClr>
+                </a:outerShdw>
+              </a:effectLst>
+            </a:endParaRPr>
           </a:p>
         </p:txBody>
       </p:sp>

</xml_diff>

<commit_message>
Cambie Walter por Lily
</commit_message>
<xml_diff>
--- a/tarea de powerpoint.pptx
+++ b/tarea de powerpoint.pptx
@@ -2986,8 +2986,8 @@
         </p:nvSpPr>
         <p:spPr>
           <a:xfrm>
-            <a:off x="5032952" y="2967335"/>
-            <a:ext cx="2126096" cy="923330"/>
+            <a:off x="5522766" y="2967335"/>
+            <a:ext cx="1146468" cy="923330"/>
           </a:xfrm>
           <a:prstGeom prst="rect">
             <a:avLst/>
@@ -3002,16 +3002,13 @@
           <a:p>
             <a:pPr algn="ctr"/>
             <a:r>
-              <a:rPr lang="en-US" sz="5400" b="1" cap="none" spc="0" smtClean="0">
+              <a:rPr lang="en-US" sz="5400" b="1" smtClean="0">
                 <a:ln w="9525">
                   <a:solidFill>
                     <a:schemeClr val="bg1"/>
                   </a:solidFill>
                   <a:prstDash val="solid"/>
                 </a:ln>
-                <a:solidFill>
-                  <a:schemeClr val="tx1"/>
-                </a:solidFill>
                 <a:effectLst>
                   <a:outerShdw blurRad="12700" dist="38100" dir="2700000" algn="tl" rotWithShape="0">
                     <a:schemeClr val="bg1">
@@ -3020,7 +3017,7 @@
                   </a:outerShdw>
                 </a:effectLst>
               </a:rPr>
-              <a:t>Walter</a:t>
+              <a:t>Lily</a:t>
             </a:r>
             <a:endParaRPr lang="es-ES" sz="5400" b="1" cap="none" spc="0" dirty="0">
               <a:ln w="9525">

</xml_diff>